<commit_message>
do shall not work
</commit_message>
<xml_diff>
--- a/kalevala/Documents/Olio-ohjelmointi.pptx
+++ b/kalevala/Documents/Olio-ohjelmointi.pptx
@@ -8352,6 +8352,12 @@
             </a:r>
           </a:p>
           <a:p>
+            <a:pPr marL="457200" lvl="1" indent="0">
+              <a:buNone/>
+            </a:pPr>
+            <a:endParaRPr lang="fi-FI" dirty="0"/>
+          </a:p>
+          <a:p>
             <a:pPr marL="0" indent="0">
               <a:buNone/>
             </a:pPr>

</xml_diff>